<commit_message>
Did some modifications on file arrangements
</commit_message>
<xml_diff>
--- a/Presentation.pptx
+++ b/Presentation.pptx
@@ -16,7 +16,8 @@
     <p:sldId id="264" r:id="rId10"/>
     <p:sldId id="265" r:id="rId11"/>
     <p:sldId id="266" r:id="rId12"/>
-    <p:sldId id="267" r:id="rId13"/>
+    <p:sldId id="268" r:id="rId13"/>
+    <p:sldId id="267" r:id="rId14"/>
   </p:sldIdLst>
   <p:sldSz cx="12192000" cy="6858000"/>
   <p:notesSz cx="6858000" cy="9144000"/>
@@ -270,7 +271,7 @@
           <a:p>
             <a:fld id="{91D9DE76-7398-404C-8BAB-E11B25B01135}" type="datetimeFigureOut">
               <a:rPr lang="en-US" smtClean="0"/>
-              <a:t>2/5/2025</a:t>
+              <a:t>2/7/2025</a:t>
             </a:fld>
             <a:endParaRPr lang="en-US"/>
           </a:p>
@@ -468,7 +469,7 @@
           <a:p>
             <a:fld id="{91D9DE76-7398-404C-8BAB-E11B25B01135}" type="datetimeFigureOut">
               <a:rPr lang="en-US" smtClean="0"/>
-              <a:t>2/5/2025</a:t>
+              <a:t>2/7/2025</a:t>
             </a:fld>
             <a:endParaRPr lang="en-US"/>
           </a:p>
@@ -676,7 +677,7 @@
           <a:p>
             <a:fld id="{91D9DE76-7398-404C-8BAB-E11B25B01135}" type="datetimeFigureOut">
               <a:rPr lang="en-US" smtClean="0"/>
-              <a:t>2/5/2025</a:t>
+              <a:t>2/7/2025</a:t>
             </a:fld>
             <a:endParaRPr lang="en-US"/>
           </a:p>
@@ -874,7 +875,7 @@
           <a:p>
             <a:fld id="{91D9DE76-7398-404C-8BAB-E11B25B01135}" type="datetimeFigureOut">
               <a:rPr lang="en-US" smtClean="0"/>
-              <a:t>2/5/2025</a:t>
+              <a:t>2/7/2025</a:t>
             </a:fld>
             <a:endParaRPr lang="en-US"/>
           </a:p>
@@ -1149,7 +1150,7 @@
           <a:p>
             <a:fld id="{91D9DE76-7398-404C-8BAB-E11B25B01135}" type="datetimeFigureOut">
               <a:rPr lang="en-US" smtClean="0"/>
-              <a:t>2/5/2025</a:t>
+              <a:t>2/7/2025</a:t>
             </a:fld>
             <a:endParaRPr lang="en-US"/>
           </a:p>
@@ -1414,7 +1415,7 @@
           <a:p>
             <a:fld id="{91D9DE76-7398-404C-8BAB-E11B25B01135}" type="datetimeFigureOut">
               <a:rPr lang="en-US" smtClean="0"/>
-              <a:t>2/5/2025</a:t>
+              <a:t>2/7/2025</a:t>
             </a:fld>
             <a:endParaRPr lang="en-US"/>
           </a:p>
@@ -1826,7 +1827,7 @@
           <a:p>
             <a:fld id="{91D9DE76-7398-404C-8BAB-E11B25B01135}" type="datetimeFigureOut">
               <a:rPr lang="en-US" smtClean="0"/>
-              <a:t>2/5/2025</a:t>
+              <a:t>2/7/2025</a:t>
             </a:fld>
             <a:endParaRPr lang="en-US"/>
           </a:p>
@@ -1967,7 +1968,7 @@
           <a:p>
             <a:fld id="{91D9DE76-7398-404C-8BAB-E11B25B01135}" type="datetimeFigureOut">
               <a:rPr lang="en-US" smtClean="0"/>
-              <a:t>2/5/2025</a:t>
+              <a:t>2/7/2025</a:t>
             </a:fld>
             <a:endParaRPr lang="en-US"/>
           </a:p>
@@ -2080,7 +2081,7 @@
           <a:p>
             <a:fld id="{91D9DE76-7398-404C-8BAB-E11B25B01135}" type="datetimeFigureOut">
               <a:rPr lang="en-US" smtClean="0"/>
-              <a:t>2/5/2025</a:t>
+              <a:t>2/7/2025</a:t>
             </a:fld>
             <a:endParaRPr lang="en-US"/>
           </a:p>
@@ -2391,7 +2392,7 @@
           <a:p>
             <a:fld id="{91D9DE76-7398-404C-8BAB-E11B25B01135}" type="datetimeFigureOut">
               <a:rPr lang="en-US" smtClean="0"/>
-              <a:t>2/5/2025</a:t>
+              <a:t>2/7/2025</a:t>
             </a:fld>
             <a:endParaRPr lang="en-US"/>
           </a:p>
@@ -2679,7 +2680,7 @@
           <a:p>
             <a:fld id="{91D9DE76-7398-404C-8BAB-E11B25B01135}" type="datetimeFigureOut">
               <a:rPr lang="en-US" smtClean="0"/>
-              <a:t>2/5/2025</a:t>
+              <a:t>2/7/2025</a:t>
             </a:fld>
             <a:endParaRPr lang="en-US"/>
           </a:p>
@@ -2920,7 +2921,7 @@
           <a:p>
             <a:fld id="{91D9DE76-7398-404C-8BAB-E11B25B01135}" type="datetimeFigureOut">
               <a:rPr lang="en-US" smtClean="0"/>
-              <a:t>2/5/2025</a:t>
+              <a:t>2/7/2025</a:t>
             </a:fld>
             <a:endParaRPr lang="en-US"/>
           </a:p>
@@ -3792,6 +3793,125 @@
           <p:cNvPr id="2" name="Title 1">
             <a:extLst>
               <a:ext uri="{FF2B5EF4-FFF2-40B4-BE49-F238E27FC236}">
+                <a16:creationId xmlns:a16="http://schemas.microsoft.com/office/drawing/2014/main" id="{33A9169F-DEB2-7C38-28B7-4F4D5FAA7E77}"/>
+              </a:ext>
+            </a:extLst>
+          </p:cNvPr>
+          <p:cNvSpPr>
+            <a:spLocks noGrp="1"/>
+          </p:cNvSpPr>
+          <p:nvPr>
+            <p:ph type="title"/>
+          </p:nvPr>
+        </p:nvSpPr>
+        <p:spPr>
+          <a:xfrm>
+            <a:off x="838200" y="365126"/>
+            <a:ext cx="10515600" cy="832304"/>
+          </a:xfrm>
+        </p:spPr>
+        <p:txBody>
+          <a:bodyPr>
+            <a:normAutofit/>
+          </a:bodyPr>
+          <a:lstStyle/>
+          <a:p>
+            <a:pPr algn="ctr"/>
+            <a:r>
+              <a:rPr lang="en-US" sz="2800" b="1" dirty="0">
+                <a:latin typeface="Times New Roman" panose="02020603050405020304" pitchFamily="18" charset="0"/>
+                <a:cs typeface="Times New Roman" panose="02020603050405020304" pitchFamily="18" charset="0"/>
+              </a:rPr>
+              <a:t>Conclusion</a:t>
+            </a:r>
+          </a:p>
+        </p:txBody>
+      </p:sp>
+      <p:sp>
+        <p:nvSpPr>
+          <p:cNvPr id="3" name="Content Placeholder 2">
+            <a:extLst>
+              <a:ext uri="{FF2B5EF4-FFF2-40B4-BE49-F238E27FC236}">
+                <a16:creationId xmlns:a16="http://schemas.microsoft.com/office/drawing/2014/main" id="{69A3E242-DC5C-6D89-DE9D-7B1B8929BEA1}"/>
+              </a:ext>
+            </a:extLst>
+          </p:cNvPr>
+          <p:cNvSpPr>
+            <a:spLocks noGrp="1"/>
+          </p:cNvSpPr>
+          <p:nvPr>
+            <p:ph idx="1"/>
+          </p:nvPr>
+        </p:nvSpPr>
+        <p:spPr>
+          <a:xfrm>
+            <a:off x="838200" y="1197430"/>
+            <a:ext cx="10515600" cy="4979533"/>
+          </a:xfrm>
+        </p:spPr>
+        <p:txBody>
+          <a:bodyPr/>
+          <a:lstStyle/>
+          <a:p>
+            <a:pPr marL="0" indent="0">
+              <a:buNone/>
+            </a:pPr>
+            <a:r>
+              <a:rPr lang="en-US" dirty="0">
+                <a:latin typeface="Times New Roman" panose="02020603050405020304" pitchFamily="18" charset="0"/>
+                <a:cs typeface="Times New Roman" panose="02020603050405020304" pitchFamily="18" charset="0"/>
+              </a:rPr>
+              <a:t>Our analysis of aviation accident data highlights key risk factors that must be addressed before starting the aviation business. While aviation safety has improved over the years, factors such as aircraft model choice, purpose of the aircraft maintenance practices, pilot training, and flight conditions play a critical role in accident prevention. By implementing data-driven safety measures, investing in well-maintained multi-engine aircraft, and adhering to strict operational standards, we can mitigate risks and enhance flight safety. These insights will guide strategic decisions to ensure a safe and sustainable aviation </a:t>
+            </a:r>
+            <a:r>
+              <a:rPr lang="en-US" dirty="0" err="1">
+                <a:latin typeface="Times New Roman" panose="02020603050405020304" pitchFamily="18" charset="0"/>
+                <a:cs typeface="Times New Roman" panose="02020603050405020304" pitchFamily="18" charset="0"/>
+              </a:rPr>
+              <a:t>operatio</a:t>
+            </a:r>
+            <a:endParaRPr lang="en-US" dirty="0">
+              <a:latin typeface="Times New Roman" panose="02020603050405020304" pitchFamily="18" charset="0"/>
+              <a:cs typeface="Times New Roman" panose="02020603050405020304" pitchFamily="18" charset="0"/>
+            </a:endParaRPr>
+          </a:p>
+        </p:txBody>
+      </p:sp>
+    </p:spTree>
+    <p:extLst>
+      <p:ext uri="{BB962C8B-B14F-4D97-AF65-F5344CB8AC3E}">
+        <p14:creationId xmlns:p14="http://schemas.microsoft.com/office/powerpoint/2010/main" val="22957020"/>
+      </p:ext>
+    </p:extLst>
+  </p:cSld>
+  <p:clrMapOvr>
+    <a:masterClrMapping/>
+  </p:clrMapOvr>
+</p:sld>
+</file>
+
+<file path=ppt/slides/slide13.xml><?xml version="1.0" encoding="utf-8"?>
+<p:sld xmlns:a="http://schemas.openxmlformats.org/drawingml/2006/main" xmlns:r="http://schemas.openxmlformats.org/officeDocument/2006/relationships" xmlns:p="http://schemas.openxmlformats.org/presentationml/2006/main">
+  <p:cSld>
+    <p:spTree>
+      <p:nvGrpSpPr>
+        <p:cNvPr id="1" name=""/>
+        <p:cNvGrpSpPr/>
+        <p:nvPr/>
+      </p:nvGrpSpPr>
+      <p:grpSpPr>
+        <a:xfrm>
+          <a:off x="0" y="0"/>
+          <a:ext cx="0" cy="0"/>
+          <a:chOff x="0" y="0"/>
+          <a:chExt cx="0" cy="0"/>
+        </a:xfrm>
+      </p:grpSpPr>
+      <p:sp>
+        <p:nvSpPr>
+          <p:cNvPr id="2" name="Title 1">
+            <a:extLst>
+              <a:ext uri="{FF2B5EF4-FFF2-40B4-BE49-F238E27FC236}">
                 <a16:creationId xmlns:a16="http://schemas.microsoft.com/office/drawing/2014/main" id="{0C792869-887B-AEAC-5B22-4B5E3AEBA3E2}"/>
               </a:ext>
             </a:extLst>

</xml_diff>